<commit_message>
Add notes copying functionality during slide addition
</commit_message>
<xml_diff>
--- a/test/ShapeCrawler.Tests.Unit/Assets/008.pptx
+++ b/test/ShapeCrawler.Tests.Unit/Assets/008.pptx
@@ -209,7 +209,7 @@
           <a:p>
             <a:fld id="{6643A5C1-FF59-478F-A216-1B3BDF75519A}" type="datetimeFigureOut">
               <a:rPr lang="ru-UA" smtClean="0"/>
-              <a:t>07/29/2022</a:t>
+              <a:t>08/20/2024</a:t>
             </a:fld>
             <a:endParaRPr lang="ru-UA"/>
           </a:p>
@@ -475,6 +475,94 @@
     </a:lvl9pPr>
   </p:notesStyle>
 </p:notesMaster>
+</file>
+
+<file path=ppt/notesSlides/notesSlide1.xml><?xml version="1.0" encoding="utf-8"?>
+<p:notes xmlns:a="http://schemas.openxmlformats.org/drawingml/2006/main" xmlns:r="http://schemas.openxmlformats.org/officeDocument/2006/relationships" xmlns:p="http://schemas.openxmlformats.org/presentationml/2006/main">
+  <p:cSld>
+    <p:spTree>
+      <p:nvGrpSpPr>
+        <p:cNvPr id="1" name=""/>
+        <p:cNvGrpSpPr/>
+        <p:nvPr/>
+      </p:nvGrpSpPr>
+      <p:grpSpPr>
+        <a:xfrm>
+          <a:off x="0" y="0"/>
+          <a:ext cx="0" cy="0"/>
+          <a:chOff x="0" y="0"/>
+          <a:chExt cx="0" cy="0"/>
+        </a:xfrm>
+      </p:grpSpPr>
+      <p:sp>
+        <p:nvSpPr>
+          <p:cNvPr id="2" name="Slide Image Placeholder 1"/>
+          <p:cNvSpPr>
+            <a:spLocks noGrp="1" noRot="1" noChangeAspect="1"/>
+          </p:cNvSpPr>
+          <p:nvPr>
+            <p:ph type="sldImg"/>
+          </p:nvPr>
+        </p:nvSpPr>
+        <p:spPr/>
+      </p:sp>
+      <p:sp>
+        <p:nvSpPr>
+          <p:cNvPr id="3" name="Notes Placeholder 2"/>
+          <p:cNvSpPr>
+            <a:spLocks noGrp="1"/>
+          </p:cNvSpPr>
+          <p:nvPr>
+            <p:ph type="body" idx="1"/>
+          </p:nvPr>
+        </p:nvSpPr>
+        <p:spPr/>
+        <p:txBody>
+          <a:bodyPr/>
+          <a:lstStyle/>
+          <a:p>
+            <a:r>
+              <a:rPr lang="en-US"/>
+              <a:t>Test note</a:t>
+            </a:r>
+            <a:endParaRPr lang="LID4096"/>
+          </a:p>
+        </p:txBody>
+      </p:sp>
+      <p:sp>
+        <p:nvSpPr>
+          <p:cNvPr id="4" name="Slide Number Placeholder 3"/>
+          <p:cNvSpPr>
+            <a:spLocks noGrp="1"/>
+          </p:cNvSpPr>
+          <p:nvPr>
+            <p:ph type="sldNum" sz="quarter" idx="5"/>
+          </p:nvPr>
+        </p:nvSpPr>
+        <p:spPr/>
+        <p:txBody>
+          <a:bodyPr/>
+          <a:lstStyle/>
+          <a:p>
+            <a:fld id="{44BEBD69-27AA-4140-81F9-A8C50E416D7C}" type="slidenum">
+              <a:rPr lang="ru-UA" smtClean="0"/>
+              <a:t>1</a:t>
+            </a:fld>
+            <a:endParaRPr lang="ru-UA"/>
+          </a:p>
+        </p:txBody>
+      </p:sp>
+    </p:spTree>
+    <p:extLst>
+      <p:ext uri="{BB962C8B-B14F-4D97-AF65-F5344CB8AC3E}">
+        <p14:creationId xmlns:p14="http://schemas.microsoft.com/office/powerpoint/2010/main" val="1363616836"/>
+      </p:ext>
+    </p:extLst>
+  </p:cSld>
+  <p:clrMapOvr>
+    <a:masterClrMapping/>
+  </p:clrMapOvr>
+</p:notes>
 </file>
 
 <file path=ppt/slideLayouts/slideLayout1.xml><?xml version="1.0" encoding="utf-8"?>
@@ -554,7 +642,7 @@
           <a:p>
             <a:fld id="{1B77F1EA-A28E-4D68-96FE-34F62A372CDB}" type="datetime1">
               <a:rPr lang="ru-UA" smtClean="0"/>
-              <a:t>07/29/2022</a:t>
+              <a:t>08/20/2024</a:t>
             </a:fld>
             <a:endParaRPr lang="ru-UA"/>
           </a:p>
@@ -639,7 +727,7 @@
           <a:p>
             <a:fld id="{A9FFDF2F-4147-4231-9A8F-F7CA15E6680D}" type="datetime1">
               <a:rPr lang="ru-UA" smtClean="0"/>
-              <a:t>07/29/2022</a:t>
+              <a:t>08/20/2024</a:t>
             </a:fld>
             <a:endParaRPr lang="ru-UA"/>
           </a:p>
@@ -988,6 +1076,13 @@
           </a:effectRef>
           <a:fontRef idx="minor"/>
         </p:style>
+        <p:txBody>
+          <a:bodyPr/>
+          <a:lstStyle/>
+          <a:p>
+            <a:endParaRPr lang="LID4096"/>
+          </a:p>
+        </p:txBody>
       </p:sp>
       <p:sp>
         <p:nvSpPr>
@@ -1115,7 +1210,7 @@
           <a:p>
             <a:fld id="{96A3F98C-A836-4DD5-B3E3-3C266B70917C}" type="datetime1">
               <a:rPr lang="ru-UA" smtClean="0"/>
-              <a:t>07/29/2022</a:t>
+              <a:t>08/20/2024</a:t>
             </a:fld>
             <a:endParaRPr lang="ru-UA"/>
           </a:p>

</xml_diff>